<commit_message>
#118 Commit: Final Report 🔄- Introduction ✅
</commit_message>
<xml_diff>
--- a/Presentation/Presentation.pptx
+++ b/Presentation/Presentation.pptx
@@ -2742,7 +2742,15 @@
             </a:r>
             <a:r>
               <a:rPr lang="en" dirty="0"/>
-              <a:t> (Local outlier factor ) do scikit-learn. It measures the local deviation of density of a given sample with respect to its neighbors</a:t>
+              <a:t> (Local </a:t>
+            </a:r>
+            <a:r>
+              <a:rPr lang="en"/>
+              <a:t>outlier factor) </a:t>
+            </a:r>
+            <a:r>
+              <a:rPr lang="en" dirty="0"/>
+              <a:t>do scikit-learn. It measures the local deviation of density of a given sample with respect to its neighbors</a:t>
             </a:r>
             <a:endParaRPr dirty="0"/>
           </a:p>

</xml_diff>